<commit_message>
add model selection notes
</commit_message>
<xml_diff>
--- a/OtherMaterials/2018 Machine Learning Course - Group Assignment Presentation Guidelines.pptx
+++ b/OtherMaterials/2018 Machine Learning Course - Group Assignment Presentation Guidelines.pptx
@@ -4796,13 +4796,8 @@
           <a:p>
             <a:r>
               <a:rPr lang="en-US" dirty="0" smtClean="0"/>
-              <a:t>MGMT E-5072, Fall </a:t>
-            </a:r>
-            <a:r>
-              <a:rPr lang="en-US" dirty="0" smtClean="0"/>
-              <a:t>2018</a:t>
-            </a:r>
-            <a:endParaRPr lang="en-US" dirty="0" smtClean="0"/>
+              <a:t>MGMT E-5072, Fall 2018</a:t>
+            </a:r>
           </a:p>
           <a:p>
             <a:r>
@@ -5146,11 +5141,7 @@
             <a:pPr lvl="1"/>
             <a:r>
               <a:rPr lang="en-US" dirty="0" smtClean="0"/>
-              <a:t>Other detail that informed the </a:t>
-            </a:r>
-            <a:r>
-              <a:rPr lang="en-US" dirty="0" smtClean="0"/>
-              <a:t>analysis</a:t>
+              <a:t>Other detail that informed the analysis</a:t>
             </a:r>
           </a:p>
           <a:p>
@@ -5383,21 +5374,8 @@
           <a:p>
             <a:r>
               <a:rPr lang="en-US" dirty="0" smtClean="0"/>
-              <a:t>Teams have been assigned on Canvas. Please </a:t>
-            </a:r>
-            <a:r>
-              <a:rPr lang="en-US" dirty="0" smtClean="0"/>
-              <a:t>look </a:t>
-            </a:r>
-            <a:r>
-              <a:rPr lang="en-US" dirty="0" smtClean="0"/>
-              <a:t>up your </a:t>
-            </a:r>
-            <a:r>
-              <a:rPr lang="en-US" dirty="0" smtClean="0"/>
-              <a:t>teammates and connect with them. </a:t>
-            </a:r>
-            <a:endParaRPr lang="en-US" dirty="0" smtClean="0"/>
+              <a:t>Teams have been assigned on Canvas. Please look up your teammates and connect with them. </a:t>
+            </a:r>
           </a:p>
           <a:p>
             <a:pPr marL="0" indent="0">
@@ -5408,15 +5386,7 @@
           <a:p>
             <a:r>
               <a:rPr lang="en-US" dirty="0" smtClean="0"/>
-              <a:t>Each </a:t>
-            </a:r>
-            <a:r>
-              <a:rPr lang="en-US" dirty="0" smtClean="0"/>
-              <a:t>team will have </a:t>
-            </a:r>
-            <a:r>
-              <a:rPr lang="en-US" dirty="0" smtClean="0"/>
-              <a:t>its own Page on Canvas where team specific information (e.g. raw files and announcements) will be posted. Feel free to use other features of your Team </a:t>
+              <a:t>Each team will have its own Page on Canvas where team specific information (e.g. raw files and announcements) will be posted. Feel free to use other features of your Team </a:t>
             </a:r>
             <a:r>
               <a:rPr lang="en-US" dirty="0"/>
@@ -5618,7 +5588,6 @@
               <a:rPr lang="en-US" sz="1400" dirty="0" smtClean="0"/>
               <a:t>What steps will you take to solve the problem? List the steps clearly. </a:t>
             </a:r>
-            <a:endParaRPr lang="en-US" sz="1400" dirty="0" smtClean="0"/>
           </a:p>
           <a:p>
             <a:r>
@@ -5639,7 +5608,6 @@
               <a:rPr lang="en-US" sz="1400" dirty="0" smtClean="0"/>
               <a:t>Measure and fine tune model performance </a:t>
             </a:r>
-            <a:endParaRPr lang="en-US" sz="1400" dirty="0" smtClean="0"/>
           </a:p>
         </p:txBody>
       </p:sp>

</xml_diff>